<commit_message>
saving project 1 report and editing
</commit_message>
<xml_diff>
--- a/Homework/Project01/Report/Images/architectures.pptx
+++ b/Homework/Project01/Report/Images/architectures.pptx
@@ -11,6 +11,9 @@
     <p:sldId id="259" r:id="rId6"/>
     <p:sldId id="260" r:id="rId7"/>
     <p:sldId id="261" r:id="rId8"/>
+    <p:sldId id="262" r:id="rId9"/>
+    <p:sldId id="263" r:id="rId10"/>
+    <p:sldId id="264" r:id="rId11"/>
   </p:sldIdLst>
   <p:sldSz cx="12192000" cy="6858000"/>
   <p:notesSz cx="7772400" cy="10058400"/>
@@ -1492,14 +1495,14 @@
                 <a:spcPct val="100000"/>
               </a:lnSpc>
             </a:pPr>
-            <a:fld id="{DC03DE46-FF3A-4F66-9E0C-082371E7D0CE}" type="datetime">
+            <a:fld id="{6C29727E-47C9-4936-AC8B-88570D63E852}" type="datetime">
               <a:rPr b="0" lang="en-US" sz="1200" spc="-1" strike="noStrike">
                 <a:solidFill>
                   <a:srgbClr val="8b8b8b"/>
                 </a:solidFill>
                 <a:latin typeface="Calibri"/>
               </a:rPr>
-              <a:t>11/3/19</a:t>
+              <a:t>11/4/19</a:t>
             </a:fld>
             <a:endParaRPr b="0" lang="en-US" sz="1200" spc="-1" strike="noStrike">
               <a:latin typeface="Times New Roman"/>
@@ -1562,7 +1565,7 @@
                 <a:spcPct val="100000"/>
               </a:lnSpc>
             </a:pPr>
-            <a:fld id="{C8D60C04-475E-409B-A117-42AD14E58FA6}" type="slidenum">
+            <a:fld id="{2D9F950E-F1B3-41CD-8CB6-BABB5FF78F3D}" type="slidenum">
               <a:rPr b="0" lang="en-US" sz="1200" spc="-1" strike="noStrike">
                 <a:solidFill>
                   <a:srgbClr val="8b8b8b"/>
@@ -1606,7 +1609,34 @@
                 </a:solidFill>
                 <a:latin typeface="Calibri"/>
               </a:rPr>
-              <a:t>Click to edit the title text format</a:t>
+              <a:t>Click to </a:t>
+            </a:r>
+            <a:r>
+              <a:rPr b="0" lang="en-US" sz="1800" spc="-1" strike="noStrike">
+                <a:solidFill>
+                  <a:srgbClr val="000000"/>
+                </a:solidFill>
+                <a:latin typeface="Calibri"/>
+              </a:rPr>
+              <a:t>edit the </a:t>
+            </a:r>
+            <a:r>
+              <a:rPr b="0" lang="en-US" sz="1800" spc="-1" strike="noStrike">
+                <a:solidFill>
+                  <a:srgbClr val="000000"/>
+                </a:solidFill>
+                <a:latin typeface="Calibri"/>
+              </a:rPr>
+              <a:t>title text </a:t>
+            </a:r>
+            <a:r>
+              <a:rPr b="0" lang="en-US" sz="1800" spc="-1" strike="noStrike">
+                <a:solidFill>
+                  <a:srgbClr val="000000"/>
+                </a:solidFill>
+                <a:latin typeface="Calibri"/>
+              </a:rPr>
+              <a:t>format</a:t>
             </a:r>
             <a:endParaRPr b="0" lang="en-US" sz="1800" spc="-1" strike="noStrike">
               <a:solidFill>
@@ -7724,6 +7754,70 @@
         </p:nvSpPr>
         <p:spPr>
           <a:xfrm>
+            <a:off x="5486400" y="914400"/>
+            <a:ext cx="5303520" cy="5486400"/>
+          </a:xfrm>
+          <a:prstGeom prst="rect">
+            <a:avLst/>
+          </a:prstGeom>
+          <a:solidFill>
+            <a:srgbClr val="808080">
+              <a:alpha val="30000"/>
+            </a:srgbClr>
+          </a:solidFill>
+          <a:ln>
+            <a:solidFill>
+              <a:srgbClr val="3465a4"/>
+            </a:solidFill>
+          </a:ln>
+        </p:spPr>
+        <p:style>
+          <a:lnRef idx="0"/>
+          <a:fillRef idx="0"/>
+          <a:effectRef idx="0"/>
+          <a:fontRef idx="minor"/>
+        </p:style>
+      </p:sp>
+      <p:sp>
+        <p:nvSpPr>
+          <p:cNvPr id="172" name="CustomShape 2"/>
+          <p:cNvSpPr/>
+          <p:nvPr/>
+        </p:nvSpPr>
+        <p:spPr>
+          <a:xfrm>
+            <a:off x="182880" y="914400"/>
+            <a:ext cx="5303520" cy="5486400"/>
+          </a:xfrm>
+          <a:prstGeom prst="rect">
+            <a:avLst/>
+          </a:prstGeom>
+          <a:solidFill>
+            <a:srgbClr val="808080">
+              <a:alpha val="30000"/>
+            </a:srgbClr>
+          </a:solidFill>
+          <a:ln>
+            <a:solidFill>
+              <a:srgbClr val="3465a4"/>
+            </a:solidFill>
+          </a:ln>
+        </p:spPr>
+        <p:style>
+          <a:lnRef idx="0"/>
+          <a:fillRef idx="0"/>
+          <a:effectRef idx="0"/>
+          <a:fontRef idx="minor"/>
+        </p:style>
+      </p:sp>
+      <p:sp>
+        <p:nvSpPr>
+          <p:cNvPr id="173" name="CustomShape 3"/>
+          <p:cNvSpPr/>
+          <p:nvPr/>
+        </p:nvSpPr>
+        <p:spPr>
+          <a:xfrm>
             <a:off x="2651760" y="2468880"/>
             <a:ext cx="1437840" cy="2743200"/>
           </a:xfrm>
@@ -7749,7 +7843,7 @@
       </p:sp>
       <p:sp>
         <p:nvSpPr>
-          <p:cNvPr id="172" name="CustomShape 2"/>
+          <p:cNvPr id="174" name="CustomShape 4"/>
           <p:cNvSpPr/>
           <p:nvPr/>
         </p:nvSpPr>
@@ -7783,14 +7877,14 @@
       </p:sp>
       <p:sp>
         <p:nvSpPr>
-          <p:cNvPr id="173" name="CustomShape 3"/>
+          <p:cNvPr id="175" name="CustomShape 5"/>
           <p:cNvSpPr/>
           <p:nvPr/>
         </p:nvSpPr>
         <p:spPr>
           <a:xfrm>
             <a:off x="2676960" y="1281240"/>
-            <a:ext cx="1437840" cy="364680"/>
+            <a:ext cx="1437840" cy="363960"/>
           </a:xfrm>
           <a:prstGeom prst="rect">
             <a:avLst/>
@@ -7815,7 +7909,7 @@
               </a:lnSpc>
             </a:pPr>
             <a:r>
-              <a:rPr b="0" lang="en-US" sz="1800" spc="-1" strike="noStrike">
+              <a:rPr b="1" lang="en-US" sz="1800" spc="-1" strike="noStrike">
                 <a:solidFill>
                   <a:srgbClr val="000000"/>
                 </a:solidFill>
@@ -7823,7 +7917,7 @@
               </a:rPr>
               <a:t>Encoder</a:t>
             </a:r>
-            <a:endParaRPr b="0" lang="en-US" sz="1800" spc="-1" strike="noStrike">
+            <a:endParaRPr b="1" lang="en-US" sz="1800" spc="-1" strike="noStrike">
               <a:latin typeface="Arial"/>
             </a:endParaRPr>
           </a:p>
@@ -7831,14 +7925,14 @@
       </p:sp>
       <p:sp>
         <p:nvSpPr>
-          <p:cNvPr id="174" name="CustomShape 4"/>
+          <p:cNvPr id="176" name="CustomShape 6"/>
           <p:cNvSpPr/>
           <p:nvPr/>
         </p:nvSpPr>
         <p:spPr>
           <a:xfrm>
             <a:off x="6858000" y="1282680"/>
-            <a:ext cx="1437840" cy="363240"/>
+            <a:ext cx="1437840" cy="363960"/>
           </a:xfrm>
           <a:prstGeom prst="rect">
             <a:avLst/>
@@ -7863,7 +7957,7 @@
               </a:lnSpc>
             </a:pPr>
             <a:r>
-              <a:rPr b="0" lang="en-US" sz="1800" spc="-1" strike="noStrike">
+              <a:rPr b="1" lang="en-US" sz="1800" spc="-1" strike="noStrike">
                 <a:solidFill>
                   <a:srgbClr val="000000"/>
                 </a:solidFill>
@@ -7871,7 +7965,7 @@
               </a:rPr>
               <a:t>Decoder</a:t>
             </a:r>
-            <a:endParaRPr b="0" lang="en-US" sz="1800" spc="-1" strike="noStrike">
+            <a:endParaRPr b="1" lang="en-US" sz="1800" spc="-1" strike="noStrike">
               <a:latin typeface="Arial"/>
             </a:endParaRPr>
           </a:p>
@@ -7879,7 +7973,7 @@
       </p:sp>
       <p:sp>
         <p:nvSpPr>
-          <p:cNvPr id="175" name="CustomShape 5"/>
+          <p:cNvPr id="177" name="CustomShape 7"/>
           <p:cNvSpPr/>
           <p:nvPr/>
         </p:nvSpPr>
@@ -7913,7 +8007,7 @@
       </p:sp>
       <p:sp>
         <p:nvSpPr>
-          <p:cNvPr id="176" name="CustomShape 6"/>
+          <p:cNvPr id="178" name="CustomShape 8"/>
           <p:cNvSpPr/>
           <p:nvPr/>
         </p:nvSpPr>
@@ -7944,7 +8038,7 @@
       </p:sp>
       <p:sp>
         <p:nvSpPr>
-          <p:cNvPr id="177" name="CustomShape 7"/>
+          <p:cNvPr id="179" name="CustomShape 9"/>
           <p:cNvSpPr/>
           <p:nvPr/>
         </p:nvSpPr>
@@ -7975,7 +8069,7 @@
       </p:sp>
       <p:sp>
         <p:nvSpPr>
-          <p:cNvPr id="178" name="CustomShape 8"/>
+          <p:cNvPr id="180" name="CustomShape 10"/>
           <p:cNvSpPr/>
           <p:nvPr/>
         </p:nvSpPr>
@@ -8009,7 +8103,7 @@
       </p:sp>
       <p:sp>
         <p:nvSpPr>
-          <p:cNvPr id="179" name="CustomShape 9"/>
+          <p:cNvPr id="181" name="CustomShape 11"/>
           <p:cNvSpPr/>
           <p:nvPr/>
         </p:nvSpPr>
@@ -8043,7 +8137,7 @@
       </p:sp>
       <p:sp>
         <p:nvSpPr>
-          <p:cNvPr id="180" name="CustomShape 10"/>
+          <p:cNvPr id="182" name="CustomShape 12"/>
           <p:cNvSpPr/>
           <p:nvPr/>
         </p:nvSpPr>
@@ -8077,7 +8171,7 @@
       </p:sp>
       <p:sp>
         <p:nvSpPr>
-          <p:cNvPr id="181" name="CustomShape 11"/>
+          <p:cNvPr id="183" name="CustomShape 13"/>
           <p:cNvSpPr/>
           <p:nvPr/>
         </p:nvSpPr>
@@ -8111,7 +8205,7 @@
       </p:sp>
       <p:sp>
         <p:nvSpPr>
-          <p:cNvPr id="182" name="CustomShape 12"/>
+          <p:cNvPr id="184" name="CustomShape 14"/>
           <p:cNvSpPr/>
           <p:nvPr/>
         </p:nvSpPr>
@@ -8140,70 +8234,6 @@
           <a:effectRef idx="0">
             <a:schemeClr val="accent2"/>
           </a:effectRef>
-          <a:fontRef idx="minor"/>
-        </p:style>
-      </p:sp>
-      <p:sp>
-        <p:nvSpPr>
-          <p:cNvPr id="183" name="CustomShape 13"/>
-          <p:cNvSpPr/>
-          <p:nvPr/>
-        </p:nvSpPr>
-        <p:spPr>
-          <a:xfrm>
-            <a:off x="182880" y="914400"/>
-            <a:ext cx="5303520" cy="5486400"/>
-          </a:xfrm>
-          <a:prstGeom prst="rect">
-            <a:avLst/>
-          </a:prstGeom>
-          <a:solidFill>
-            <a:srgbClr val="808080">
-              <a:alpha val="30000"/>
-            </a:srgbClr>
-          </a:solidFill>
-          <a:ln>
-            <a:solidFill>
-              <a:srgbClr val="3465a4"/>
-            </a:solidFill>
-          </a:ln>
-        </p:spPr>
-        <p:style>
-          <a:lnRef idx="0"/>
-          <a:fillRef idx="0"/>
-          <a:effectRef idx="0"/>
-          <a:fontRef idx="minor"/>
-        </p:style>
-      </p:sp>
-      <p:sp>
-        <p:nvSpPr>
-          <p:cNvPr id="184" name="CustomShape 14"/>
-          <p:cNvSpPr/>
-          <p:nvPr/>
-        </p:nvSpPr>
-        <p:spPr>
-          <a:xfrm>
-            <a:off x="5486400" y="914400"/>
-            <a:ext cx="5303520" cy="5486400"/>
-          </a:xfrm>
-          <a:prstGeom prst="rect">
-            <a:avLst/>
-          </a:prstGeom>
-          <a:solidFill>
-            <a:srgbClr val="808080">
-              <a:alpha val="30000"/>
-            </a:srgbClr>
-          </a:solidFill>
-          <a:ln>
-            <a:solidFill>
-              <a:srgbClr val="3465a4"/>
-            </a:solidFill>
-          </a:ln>
-        </p:spPr>
-        <p:style>
-          <a:lnRef idx="0"/>
-          <a:fillRef idx="0"/>
-          <a:effectRef idx="0"/>
           <a:fontRef idx="minor"/>
         </p:style>
       </p:sp>
@@ -8216,6 +8246,567 @@
           <p:childTnLst>
             <p:seq>
               <p:cTn id="12" dur="indefinite" nodeType="mainSeq"/>
+              <p:prevCondLst>
+                <p:cond delay="0" evt="onPrev">
+                  <p:tgtEl>
+                    <p:sldTgt/>
+                  </p:tgtEl>
+                </p:cond>
+              </p:prevCondLst>
+              <p:nextCondLst>
+                <p:cond delay="0" evt="onNext">
+                  <p:tgtEl>
+                    <p:sldTgt/>
+                  </p:tgtEl>
+                </p:cond>
+              </p:nextCondLst>
+            </p:seq>
+          </p:childTnLst>
+        </p:cTn>
+      </p:par>
+    </p:tnLst>
+  </p:timing>
+</p:sld>
+</file>
+
+<file path=ppt/slides/slide7.xml><?xml version="1.0" encoding="utf-8"?>
+<p:sld xmlns:a="http://schemas.openxmlformats.org/drawingml/2006/main" xmlns:p="http://schemas.openxmlformats.org/presentationml/2006/main" xmlns:r="http://schemas.openxmlformats.org/officeDocument/2006/relationships" xmlns:p14="http://schemas.microsoft.com/office/powerpoint/2010/main" xmlns:p15="http://schemas.microsoft.com/office/powerpoint/2012/main" xmlns:mc="http://schemas.openxmlformats.org/markup-compatibility/2006">
+  <p:cSld>
+    <p:spTree>
+      <p:nvGrpSpPr>
+        <p:cNvPr id="1" name=""/>
+        <p:cNvGrpSpPr/>
+        <p:nvPr/>
+      </p:nvGrpSpPr>
+      <p:grpSpPr>
+        <a:xfrm>
+          <a:off x="0" y="0"/>
+          <a:ext cx="0" cy="0"/>
+          <a:chOff x="0" y="0"/>
+          <a:chExt cx="0" cy="0"/>
+        </a:xfrm>
+      </p:grpSpPr>
+      <p:pic>
+        <p:nvPicPr>
+          <p:cNvPr id="185" name="" descr=""/>
+          <p:cNvPicPr/>
+          <p:nvPr/>
+        </p:nvPicPr>
+        <p:blipFill>
+          <a:blip r:embed="rId1"/>
+          <a:stretch/>
+        </p:blipFill>
+        <p:spPr>
+          <a:xfrm>
+            <a:off x="3840480" y="1920240"/>
+            <a:ext cx="933120" cy="923400"/>
+          </a:xfrm>
+          <a:prstGeom prst="rect">
+            <a:avLst/>
+          </a:prstGeom>
+          <a:ln>
+            <a:noFill/>
+          </a:ln>
+        </p:spPr>
+      </p:pic>
+      <p:pic>
+        <p:nvPicPr>
+          <p:cNvPr id="186" name="" descr=""/>
+          <p:cNvPicPr/>
+          <p:nvPr/>
+        </p:nvPicPr>
+        <p:blipFill>
+          <a:blip r:embed="rId2"/>
+          <a:stretch/>
+        </p:blipFill>
+        <p:spPr>
+          <a:xfrm>
+            <a:off x="4989600" y="804240"/>
+            <a:ext cx="771120" cy="933120"/>
+          </a:xfrm>
+          <a:prstGeom prst="rect">
+            <a:avLst/>
+          </a:prstGeom>
+          <a:ln>
+            <a:noFill/>
+          </a:ln>
+        </p:spPr>
+      </p:pic>
+      <p:pic>
+        <p:nvPicPr>
+          <p:cNvPr id="187" name="" descr=""/>
+          <p:cNvPicPr/>
+          <p:nvPr/>
+        </p:nvPicPr>
+        <p:blipFill>
+          <a:blip r:embed="rId3"/>
+          <a:stretch/>
+        </p:blipFill>
+        <p:spPr>
+          <a:xfrm>
+            <a:off x="4937760" y="1920240"/>
+            <a:ext cx="828360" cy="923400"/>
+          </a:xfrm>
+          <a:prstGeom prst="rect">
+            <a:avLst/>
+          </a:prstGeom>
+          <a:ln>
+            <a:noFill/>
+          </a:ln>
+        </p:spPr>
+      </p:pic>
+      <p:pic>
+        <p:nvPicPr>
+          <p:cNvPr id="188" name="" descr=""/>
+          <p:cNvPicPr/>
+          <p:nvPr/>
+        </p:nvPicPr>
+        <p:blipFill>
+          <a:blip r:embed="rId4"/>
+          <a:stretch/>
+        </p:blipFill>
+        <p:spPr>
+          <a:xfrm>
+            <a:off x="6035040" y="1911240"/>
+            <a:ext cx="799920" cy="923400"/>
+          </a:xfrm>
+          <a:prstGeom prst="rect">
+            <a:avLst/>
+          </a:prstGeom>
+          <a:ln>
+            <a:noFill/>
+          </a:ln>
+        </p:spPr>
+      </p:pic>
+      <p:pic>
+        <p:nvPicPr>
+          <p:cNvPr id="189" name="" descr=""/>
+          <p:cNvPicPr/>
+          <p:nvPr/>
+        </p:nvPicPr>
+        <p:blipFill>
+          <a:blip r:embed="rId5"/>
+          <a:stretch/>
+        </p:blipFill>
+        <p:spPr>
+          <a:xfrm>
+            <a:off x="5943600" y="785160"/>
+            <a:ext cx="875880" cy="952200"/>
+          </a:xfrm>
+          <a:prstGeom prst="rect">
+            <a:avLst/>
+          </a:prstGeom>
+          <a:ln>
+            <a:noFill/>
+          </a:ln>
+        </p:spPr>
+      </p:pic>
+      <p:pic>
+        <p:nvPicPr>
+          <p:cNvPr id="190" name="" descr=""/>
+          <p:cNvPicPr/>
+          <p:nvPr/>
+        </p:nvPicPr>
+        <p:blipFill>
+          <a:blip r:embed="rId6"/>
+          <a:stretch/>
+        </p:blipFill>
+        <p:spPr>
+          <a:xfrm>
+            <a:off x="7132320" y="1920240"/>
+            <a:ext cx="752040" cy="923400"/>
+          </a:xfrm>
+          <a:prstGeom prst="rect">
+            <a:avLst/>
+          </a:prstGeom>
+          <a:ln>
+            <a:noFill/>
+          </a:ln>
+        </p:spPr>
+      </p:pic>
+      <p:pic>
+        <p:nvPicPr>
+          <p:cNvPr id="191" name="" descr=""/>
+          <p:cNvPicPr/>
+          <p:nvPr/>
+        </p:nvPicPr>
+        <p:blipFill>
+          <a:blip r:embed="rId7"/>
+          <a:stretch/>
+        </p:blipFill>
+        <p:spPr>
+          <a:xfrm>
+            <a:off x="7073640" y="822960"/>
+            <a:ext cx="790200" cy="971280"/>
+          </a:xfrm>
+          <a:prstGeom prst="rect">
+            <a:avLst/>
+          </a:prstGeom>
+          <a:ln>
+            <a:noFill/>
+          </a:ln>
+        </p:spPr>
+      </p:pic>
+      <p:pic>
+        <p:nvPicPr>
+          <p:cNvPr id="192" name="" descr=""/>
+          <p:cNvPicPr/>
+          <p:nvPr/>
+        </p:nvPicPr>
+        <p:blipFill>
+          <a:blip r:embed="rId8"/>
+          <a:stretch/>
+        </p:blipFill>
+        <p:spPr>
+          <a:xfrm>
+            <a:off x="3901680" y="823320"/>
+            <a:ext cx="761760" cy="914040"/>
+          </a:xfrm>
+          <a:prstGeom prst="rect">
+            <a:avLst/>
+          </a:prstGeom>
+          <a:ln>
+            <a:noFill/>
+          </a:ln>
+        </p:spPr>
+      </p:pic>
+      <p:pic>
+        <p:nvPicPr>
+          <p:cNvPr id="193" name="" descr=""/>
+          <p:cNvPicPr/>
+          <p:nvPr/>
+        </p:nvPicPr>
+        <p:blipFill>
+          <a:blip r:embed="rId9"/>
+          <a:stretch/>
+        </p:blipFill>
+        <p:spPr>
+          <a:xfrm>
+            <a:off x="2648160" y="800280"/>
+            <a:ext cx="1009440" cy="1028520"/>
+          </a:xfrm>
+          <a:prstGeom prst="rect">
+            <a:avLst/>
+          </a:prstGeom>
+          <a:ln>
+            <a:noFill/>
+          </a:ln>
+        </p:spPr>
+      </p:pic>
+      <p:pic>
+        <p:nvPicPr>
+          <p:cNvPr id="194" name="" descr=""/>
+          <p:cNvPicPr/>
+          <p:nvPr/>
+        </p:nvPicPr>
+        <p:blipFill>
+          <a:blip r:embed="rId10"/>
+          <a:stretch/>
+        </p:blipFill>
+        <p:spPr>
+          <a:xfrm>
+            <a:off x="2743200" y="1916640"/>
+            <a:ext cx="866520" cy="1009440"/>
+          </a:xfrm>
+          <a:prstGeom prst="rect">
+            <a:avLst/>
+          </a:prstGeom>
+          <a:ln>
+            <a:noFill/>
+          </a:ln>
+        </p:spPr>
+      </p:pic>
+    </p:spTree>
+  </p:cSld>
+  <p:timing>
+    <p:tnLst>
+      <p:par>
+        <p:cTn id="13" dur="indefinite" restart="never" nodeType="tmRoot">
+          <p:childTnLst>
+            <p:seq>
+              <p:cTn id="14" dur="indefinite" nodeType="mainSeq"/>
+              <p:prevCondLst>
+                <p:cond delay="0" evt="onPrev">
+                  <p:tgtEl>
+                    <p:sldTgt/>
+                  </p:tgtEl>
+                </p:cond>
+              </p:prevCondLst>
+              <p:nextCondLst>
+                <p:cond delay="0" evt="onNext">
+                  <p:tgtEl>
+                    <p:sldTgt/>
+                  </p:tgtEl>
+                </p:cond>
+              </p:nextCondLst>
+            </p:seq>
+          </p:childTnLst>
+        </p:cTn>
+      </p:par>
+    </p:tnLst>
+  </p:timing>
+</p:sld>
+</file>
+
+<file path=ppt/slides/slide8.xml><?xml version="1.0" encoding="utf-8"?>
+<p:sld xmlns:a="http://schemas.openxmlformats.org/drawingml/2006/main" xmlns:p="http://schemas.openxmlformats.org/presentationml/2006/main" xmlns:r="http://schemas.openxmlformats.org/officeDocument/2006/relationships" xmlns:p14="http://schemas.microsoft.com/office/powerpoint/2010/main" xmlns:p15="http://schemas.microsoft.com/office/powerpoint/2012/main" xmlns:mc="http://schemas.openxmlformats.org/markup-compatibility/2006">
+  <p:cSld>
+    <p:spTree>
+      <p:nvGrpSpPr>
+        <p:cNvPr id="1" name=""/>
+        <p:cNvGrpSpPr/>
+        <p:nvPr/>
+      </p:nvGrpSpPr>
+      <p:grpSpPr>
+        <a:xfrm>
+          <a:off x="0" y="0"/>
+          <a:ext cx="0" cy="0"/>
+          <a:chOff x="0" y="0"/>
+          <a:chExt cx="0" cy="0"/>
+        </a:xfrm>
+      </p:grpSpPr>
+      <p:pic>
+        <p:nvPicPr>
+          <p:cNvPr id="195" name="" descr=""/>
+          <p:cNvPicPr/>
+          <p:nvPr/>
+        </p:nvPicPr>
+        <p:blipFill>
+          <a:blip r:embed="rId1"/>
+          <a:stretch/>
+        </p:blipFill>
+        <p:spPr>
+          <a:xfrm>
+            <a:off x="4892040" y="2571480"/>
+            <a:ext cx="2423160" cy="1817640"/>
+          </a:xfrm>
+          <a:prstGeom prst="rect">
+            <a:avLst/>
+          </a:prstGeom>
+          <a:ln>
+            <a:noFill/>
+          </a:ln>
+        </p:spPr>
+      </p:pic>
+      <p:pic>
+        <p:nvPicPr>
+          <p:cNvPr id="196" name="" descr=""/>
+          <p:cNvPicPr/>
+          <p:nvPr/>
+        </p:nvPicPr>
+        <p:blipFill>
+          <a:blip r:embed="rId2"/>
+          <a:stretch/>
+        </p:blipFill>
+        <p:spPr>
+          <a:xfrm>
+            <a:off x="2514600" y="834120"/>
+            <a:ext cx="2423160" cy="1817640"/>
+          </a:xfrm>
+          <a:prstGeom prst="rect">
+            <a:avLst/>
+          </a:prstGeom>
+          <a:ln>
+            <a:noFill/>
+          </a:ln>
+        </p:spPr>
+      </p:pic>
+      <p:pic>
+        <p:nvPicPr>
+          <p:cNvPr id="197" name="" descr=""/>
+          <p:cNvPicPr/>
+          <p:nvPr/>
+        </p:nvPicPr>
+        <p:blipFill>
+          <a:blip r:embed="rId3"/>
+          <a:stretch/>
+        </p:blipFill>
+        <p:spPr>
+          <a:xfrm>
+            <a:off x="4846320" y="834120"/>
+            <a:ext cx="2422800" cy="1817640"/>
+          </a:xfrm>
+          <a:prstGeom prst="rect">
+            <a:avLst/>
+          </a:prstGeom>
+          <a:ln>
+            <a:noFill/>
+          </a:ln>
+        </p:spPr>
+      </p:pic>
+      <p:pic>
+        <p:nvPicPr>
+          <p:cNvPr id="198" name="" descr=""/>
+          <p:cNvPicPr/>
+          <p:nvPr/>
+        </p:nvPicPr>
+        <p:blipFill>
+          <a:blip r:embed="rId4"/>
+          <a:stretch/>
+        </p:blipFill>
+        <p:spPr>
+          <a:xfrm>
+            <a:off x="2560320" y="2571480"/>
+            <a:ext cx="2423160" cy="1817640"/>
+          </a:xfrm>
+          <a:prstGeom prst="rect">
+            <a:avLst/>
+          </a:prstGeom>
+          <a:ln>
+            <a:noFill/>
+          </a:ln>
+        </p:spPr>
+      </p:pic>
+    </p:spTree>
+  </p:cSld>
+  <p:timing>
+    <p:tnLst>
+      <p:par>
+        <p:cTn id="15" dur="indefinite" restart="never" nodeType="tmRoot">
+          <p:childTnLst>
+            <p:seq>
+              <p:cTn id="16" dur="indefinite" nodeType="mainSeq"/>
+              <p:prevCondLst>
+                <p:cond delay="0" evt="onPrev">
+                  <p:tgtEl>
+                    <p:sldTgt/>
+                  </p:tgtEl>
+                </p:cond>
+              </p:prevCondLst>
+              <p:nextCondLst>
+                <p:cond delay="0" evt="onNext">
+                  <p:tgtEl>
+                    <p:sldTgt/>
+                  </p:tgtEl>
+                </p:cond>
+              </p:nextCondLst>
+            </p:seq>
+          </p:childTnLst>
+        </p:cTn>
+      </p:par>
+    </p:tnLst>
+  </p:timing>
+</p:sld>
+</file>
+
+<file path=ppt/slides/slide9.xml><?xml version="1.0" encoding="utf-8"?>
+<p:sld xmlns:a="http://schemas.openxmlformats.org/drawingml/2006/main" xmlns:p="http://schemas.openxmlformats.org/presentationml/2006/main" xmlns:r="http://schemas.openxmlformats.org/officeDocument/2006/relationships" xmlns:p14="http://schemas.microsoft.com/office/powerpoint/2010/main" xmlns:p15="http://schemas.microsoft.com/office/powerpoint/2012/main" xmlns:mc="http://schemas.openxmlformats.org/markup-compatibility/2006">
+  <p:cSld>
+    <p:spTree>
+      <p:nvGrpSpPr>
+        <p:cNvPr id="1" name=""/>
+        <p:cNvGrpSpPr/>
+        <p:nvPr/>
+      </p:nvGrpSpPr>
+      <p:grpSpPr>
+        <a:xfrm>
+          <a:off x="0" y="0"/>
+          <a:ext cx="0" cy="0"/>
+          <a:chOff x="0" y="0"/>
+          <a:chExt cx="0" cy="0"/>
+        </a:xfrm>
+      </p:grpSpPr>
+      <p:pic>
+        <p:nvPicPr>
+          <p:cNvPr id="199" name="" descr=""/>
+          <p:cNvPicPr/>
+          <p:nvPr/>
+        </p:nvPicPr>
+        <p:blipFill>
+          <a:blip r:embed="rId1"/>
+          <a:stretch/>
+        </p:blipFill>
+        <p:spPr>
+          <a:xfrm>
+            <a:off x="1045800" y="2176200"/>
+            <a:ext cx="1971720" cy="1481400"/>
+          </a:xfrm>
+          <a:prstGeom prst="rect">
+            <a:avLst/>
+          </a:prstGeom>
+          <a:ln>
+            <a:noFill/>
+          </a:ln>
+        </p:spPr>
+      </p:pic>
+      <p:pic>
+        <p:nvPicPr>
+          <p:cNvPr id="200" name="" descr=""/>
+          <p:cNvPicPr/>
+          <p:nvPr/>
+        </p:nvPicPr>
+        <p:blipFill>
+          <a:blip r:embed="rId2"/>
+          <a:stretch/>
+        </p:blipFill>
+        <p:spPr>
+          <a:xfrm>
+            <a:off x="1045800" y="731520"/>
+            <a:ext cx="1971720" cy="1481400"/>
+          </a:xfrm>
+          <a:prstGeom prst="rect">
+            <a:avLst/>
+          </a:prstGeom>
+          <a:ln>
+            <a:noFill/>
+          </a:ln>
+        </p:spPr>
+      </p:pic>
+      <p:pic>
+        <p:nvPicPr>
+          <p:cNvPr id="201" name="" descr=""/>
+          <p:cNvPicPr/>
+          <p:nvPr/>
+        </p:nvPicPr>
+        <p:blipFill>
+          <a:blip r:embed="rId3"/>
+          <a:stretch/>
+        </p:blipFill>
+        <p:spPr>
+          <a:xfrm>
+            <a:off x="3108960" y="731520"/>
+            <a:ext cx="1950840" cy="1463040"/>
+          </a:xfrm>
+          <a:prstGeom prst="rect">
+            <a:avLst/>
+          </a:prstGeom>
+          <a:ln>
+            <a:noFill/>
+          </a:ln>
+        </p:spPr>
+      </p:pic>
+      <p:pic>
+        <p:nvPicPr>
+          <p:cNvPr id="202" name="" descr=""/>
+          <p:cNvPicPr/>
+          <p:nvPr/>
+        </p:nvPicPr>
+        <p:blipFill>
+          <a:blip r:embed="rId4"/>
+          <a:stretch/>
+        </p:blipFill>
+        <p:spPr>
+          <a:xfrm>
+            <a:off x="3078720" y="2176200"/>
+            <a:ext cx="2041920" cy="1531440"/>
+          </a:xfrm>
+          <a:prstGeom prst="rect">
+            <a:avLst/>
+          </a:prstGeom>
+          <a:ln>
+            <a:noFill/>
+          </a:ln>
+        </p:spPr>
+      </p:pic>
+    </p:spTree>
+  </p:cSld>
+  <p:timing>
+    <p:tnLst>
+      <p:par>
+        <p:cTn id="17" dur="indefinite" restart="never" nodeType="tmRoot">
+          <p:childTnLst>
+            <p:seq>
+              <p:cTn id="18" dur="indefinite" nodeType="mainSeq"/>
               <p:prevCondLst>
                 <p:cond delay="0" evt="onPrev">
                   <p:tgtEl>

</xml_diff>